<commit_message>
directory renames, backend cleanup, Started Notes file
</commit_message>
<xml_diff>
--- a/Angularjs.pptx
+++ b/Angularjs.pptx
@@ -11,6 +11,7 @@
     <p:sldId id="259" r:id="rId5"/>
     <p:sldId id="260" r:id="rId6"/>
     <p:sldId id="261" r:id="rId7"/>
+    <p:sldId id="262" r:id="rId8"/>
   </p:sldIdLst>
   <p:sldSz cx="12192000" cy="6858000"/>
   <p:notesSz cx="6858000" cy="9144000"/>
@@ -109,6 +110,11 @@
       </a:defRPr>
     </a:lvl9pPr>
   </p:defaultTextStyle>
+  <p:extLst>
+    <p:ext uri="{EFAFB233-063F-42B5-8137-9DF3F51BA10A}">
+      <p15:sldGuideLst xmlns:p15="http://schemas.microsoft.com/office/powerpoint/2012/main"/>
+    </p:ext>
+  </p:extLst>
 </p:presentation>
 </file>
 
@@ -334,7 +340,7 @@
             <a:fld id="{B61BEF0D-F0BB-DE4B-95CE-6DB70DBA9567}" type="datetimeFigureOut">
               <a:rPr lang="en-US" dirty="0"/>
               <a:pPr/>
-              <a:t>5/22/2016</a:t>
+              <a:t>5/24/2016</a:t>
             </a:fld>
             <a:endParaRPr lang="en-US" dirty="0"/>
           </a:p>
@@ -767,7 +773,7 @@
             <a:fld id="{B61BEF0D-F0BB-DE4B-95CE-6DB70DBA9567}" type="datetimeFigureOut">
               <a:rPr lang="en-US" dirty="0"/>
               <a:pPr/>
-              <a:t>5/22/2016</a:t>
+              <a:t>5/24/2016</a:t>
             </a:fld>
             <a:endParaRPr lang="en-US" dirty="0"/>
           </a:p>
@@ -1014,7 +1020,7 @@
             <a:fld id="{B61BEF0D-F0BB-DE4B-95CE-6DB70DBA9567}" type="datetimeFigureOut">
               <a:rPr lang="en-US" dirty="0"/>
               <a:pPr/>
-              <a:t>5/22/2016</a:t>
+              <a:t>5/24/2016</a:t>
             </a:fld>
             <a:endParaRPr lang="en-US" dirty="0"/>
           </a:p>
@@ -1319,7 +1325,7 @@
             <a:fld id="{B61BEF0D-F0BB-DE4B-95CE-6DB70DBA9567}" type="datetimeFigureOut">
               <a:rPr lang="en-US" dirty="0"/>
               <a:pPr/>
-              <a:t>5/22/2016</a:t>
+              <a:t>5/24/2016</a:t>
             </a:fld>
             <a:endParaRPr lang="en-US" dirty="0"/>
           </a:p>
@@ -1634,7 +1640,7 @@
             <a:fld id="{B61BEF0D-F0BB-DE4B-95CE-6DB70DBA9567}" type="datetimeFigureOut">
               <a:rPr lang="en-US" dirty="0"/>
               <a:pPr/>
-              <a:t>5/22/2016</a:t>
+              <a:t>5/24/2016</a:t>
             </a:fld>
             <a:endParaRPr lang="en-US" dirty="0"/>
           </a:p>
@@ -1933,7 +1939,7 @@
             <a:fld id="{B61BEF0D-F0BB-DE4B-95CE-6DB70DBA9567}" type="datetimeFigureOut">
               <a:rPr lang="en-US" dirty="0"/>
               <a:pPr/>
-              <a:t>5/22/2016</a:t>
+              <a:t>5/24/2016</a:t>
             </a:fld>
             <a:endParaRPr lang="en-US" dirty="0"/>
           </a:p>
@@ -2297,7 +2303,7 @@
             <a:fld id="{B61BEF0D-F0BB-DE4B-95CE-6DB70DBA9567}" type="datetimeFigureOut">
               <a:rPr lang="en-US" dirty="0"/>
               <a:pPr/>
-              <a:t>5/22/2016</a:t>
+              <a:t>5/24/2016</a:t>
             </a:fld>
             <a:endParaRPr lang="en-US" dirty="0"/>
           </a:p>
@@ -2468,7 +2474,7 @@
             <a:fld id="{B61BEF0D-F0BB-DE4B-95CE-6DB70DBA9567}" type="datetimeFigureOut">
               <a:rPr lang="en-US" dirty="0"/>
               <a:pPr/>
-              <a:t>5/22/2016</a:t>
+              <a:t>5/24/2016</a:t>
             </a:fld>
             <a:endParaRPr lang="en-US" dirty="0"/>
           </a:p>
@@ -2645,7 +2651,7 @@
             <a:fld id="{B61BEF0D-F0BB-DE4B-95CE-6DB70DBA9567}" type="datetimeFigureOut">
               <a:rPr lang="en-US" dirty="0"/>
               <a:pPr/>
-              <a:t>5/22/2016</a:t>
+              <a:t>5/24/2016</a:t>
             </a:fld>
             <a:endParaRPr lang="en-US" dirty="0"/>
           </a:p>
@@ -2812,7 +2818,7 @@
             <a:fld id="{B61BEF0D-F0BB-DE4B-95CE-6DB70DBA9567}" type="datetimeFigureOut">
               <a:rPr lang="en-US" dirty="0"/>
               <a:pPr/>
-              <a:t>5/22/2016</a:t>
+              <a:t>5/24/2016</a:t>
             </a:fld>
             <a:endParaRPr lang="en-US" dirty="0"/>
           </a:p>
@@ -3059,7 +3065,7 @@
             <a:fld id="{B61BEF0D-F0BB-DE4B-95CE-6DB70DBA9567}" type="datetimeFigureOut">
               <a:rPr lang="en-US" dirty="0"/>
               <a:pPr/>
-              <a:t>5/22/2016</a:t>
+              <a:t>5/24/2016</a:t>
             </a:fld>
             <a:endParaRPr lang="en-US" dirty="0"/>
           </a:p>
@@ -3292,7 +3298,7 @@
             <a:fld id="{B61BEF0D-F0BB-DE4B-95CE-6DB70DBA9567}" type="datetimeFigureOut">
               <a:rPr lang="en-US" dirty="0"/>
               <a:pPr/>
-              <a:t>5/22/2016</a:t>
+              <a:t>5/24/2016</a:t>
             </a:fld>
             <a:endParaRPr lang="en-US" dirty="0"/>
           </a:p>
@@ -3671,7 +3677,7 @@
             <a:fld id="{B61BEF0D-F0BB-DE4B-95CE-6DB70DBA9567}" type="datetimeFigureOut">
               <a:rPr lang="en-US" dirty="0"/>
               <a:pPr/>
-              <a:t>5/22/2016</a:t>
+              <a:t>5/24/2016</a:t>
             </a:fld>
             <a:endParaRPr lang="en-US" dirty="0"/>
           </a:p>
@@ -3786,7 +3792,7 @@
             <a:fld id="{B61BEF0D-F0BB-DE4B-95CE-6DB70DBA9567}" type="datetimeFigureOut">
               <a:rPr lang="en-US" dirty="0"/>
               <a:pPr/>
-              <a:t>5/22/2016</a:t>
+              <a:t>5/24/2016</a:t>
             </a:fld>
             <a:endParaRPr lang="en-US" dirty="0"/>
           </a:p>
@@ -3878,7 +3884,7 @@
             <a:fld id="{B61BEF0D-F0BB-DE4B-95CE-6DB70DBA9567}" type="datetimeFigureOut">
               <a:rPr lang="en-US" dirty="0"/>
               <a:pPr/>
-              <a:t>5/22/2016</a:t>
+              <a:t>5/24/2016</a:t>
             </a:fld>
             <a:endParaRPr lang="en-US" dirty="0"/>
           </a:p>
@@ -4130,7 +4136,7 @@
             <a:fld id="{B61BEF0D-F0BB-DE4B-95CE-6DB70DBA9567}" type="datetimeFigureOut">
               <a:rPr lang="en-US" dirty="0"/>
               <a:pPr/>
-              <a:t>5/22/2016</a:t>
+              <a:t>5/24/2016</a:t>
             </a:fld>
             <a:endParaRPr lang="en-US" dirty="0"/>
           </a:p>
@@ -4410,7 +4416,7 @@
             <a:fld id="{B61BEF0D-F0BB-DE4B-95CE-6DB70DBA9567}" type="datetimeFigureOut">
               <a:rPr lang="en-US" dirty="0"/>
               <a:pPr/>
-              <a:t>5/22/2016</a:t>
+              <a:t>5/24/2016</a:t>
             </a:fld>
             <a:endParaRPr lang="en-US" dirty="0"/>
           </a:p>
@@ -4813,7 +4819,7 @@
             <a:fld id="{B61BEF0D-F0BB-DE4B-95CE-6DB70DBA9567}" type="datetimeFigureOut">
               <a:rPr lang="en-US" dirty="0"/>
               <a:pPr/>
-              <a:t>5/22/2016</a:t>
+              <a:t>5/24/2016</a:t>
             </a:fld>
             <a:endParaRPr lang="en-US" dirty="0"/>
           </a:p>
@@ -5404,6 +5410,13 @@
   <p:clrMapOvr>
     <a:masterClrMapping/>
   </p:clrMapOvr>
+  <p:timing>
+    <p:tnLst>
+      <p:par>
+        <p:cTn id="1" dur="indefinite" restart="never" nodeType="tmRoot"/>
+      </p:par>
+    </p:tnLst>
+  </p:timing>
 </p:sld>
 </file>
 
@@ -5472,13 +5485,18 @@
               <a:t>When: 2009 </a:t>
             </a:r>
             <a:r>
+              <a:rPr lang="en-US" dirty="0" smtClean="0"/>
+              <a:t>(as </a:t>
+            </a:r>
+            <a:r>
               <a:rPr lang="en-US" dirty="0"/>
-              <a:t>as a side </a:t>
+              <a:t>a side </a:t>
             </a:r>
             <a:r>
               <a:rPr lang="en-US" dirty="0" smtClean="0"/>
-              <a:t>project </a:t>
-            </a:r>
+              <a:t>project)</a:t>
+            </a:r>
+            <a:endParaRPr lang="en-US" dirty="0" smtClean="0"/>
           </a:p>
           <a:p>
             <a:pPr marL="0" indent="0">
@@ -5533,16 +5551,28 @@
               <a:buNone/>
             </a:pPr>
             <a:r>
-              <a:rPr lang="en-US" dirty="0" err="1" smtClean="0"/>
-              <a:t>Hevery</a:t>
-            </a:r>
-            <a:r>
               <a:rPr lang="en-US" dirty="0" smtClean="0"/>
-              <a:t> [while] working </a:t>
+              <a:t>[</a:t>
             </a:r>
             <a:r>
               <a:rPr lang="en-US" dirty="0"/>
-              <a:t>on a project at Google called Google Feedback. </a:t>
+              <a:t>W</a:t>
+            </a:r>
+            <a:r>
+              <a:rPr lang="en-US" dirty="0" smtClean="0"/>
+              <a:t>hile</a:t>
+            </a:r>
+            <a:r>
+              <a:rPr lang="en-US" dirty="0" smtClean="0"/>
+              <a:t>] working </a:t>
+            </a:r>
+            <a:r>
+              <a:rPr lang="en-US" dirty="0"/>
+              <a:t>on a project at Google called Google </a:t>
+            </a:r>
+            <a:r>
+              <a:rPr lang="en-US" dirty="0" smtClean="0"/>
+              <a:t>Feedback, </a:t>
             </a:r>
             <a:r>
               <a:rPr lang="en-US" dirty="0" err="1"/>
@@ -6142,7 +6172,11 @@
           <a:bodyPr/>
           <a:lstStyle/>
           <a:p>
-            <a:endParaRPr lang="en-US"/>
+            <a:r>
+              <a:rPr lang="en-US" dirty="0" smtClean="0"/>
+              <a:t>John Papa Style Guild</a:t>
+            </a:r>
+            <a:endParaRPr lang="en-US" dirty="0"/>
           </a:p>
         </p:txBody>
       </p:sp>
@@ -6153,15 +6187,149 @@
             <a:spLocks noGrp="1"/>
           </p:cNvSpPr>
           <p:nvPr>
-            <p:ph idx="1"/>
-          </p:nvPr>
-        </p:nvSpPr>
-        <p:spPr/>
-        <p:txBody>
-          <a:bodyPr/>
-          <a:lstStyle/>
-          <a:p>
-            <a:endParaRPr lang="en-US"/>
+            <p:ph sz="half" idx="1"/>
+          </p:nvPr>
+        </p:nvSpPr>
+        <p:spPr/>
+        <p:txBody>
+          <a:bodyPr>
+            <a:normAutofit/>
+          </a:bodyPr>
+          <a:lstStyle/>
+          <a:p>
+            <a:r>
+              <a:rPr lang="en-US" dirty="0" smtClean="0">
+                <a:hlinkClick r:id="rId2"/>
+              </a:rPr>
+              <a:t>Single </a:t>
+            </a:r>
+            <a:r>
+              <a:rPr lang="en-US" dirty="0">
+                <a:hlinkClick r:id="rId2"/>
+              </a:rPr>
+              <a:t>Responsibility</a:t>
+            </a:r>
+            <a:endParaRPr lang="en-US" dirty="0"/>
+          </a:p>
+          <a:p>
+            <a:r>
+              <a:rPr lang="en-US" dirty="0">
+                <a:hlinkClick r:id="rId3"/>
+              </a:rPr>
+              <a:t>IIFE</a:t>
+            </a:r>
+            <a:endParaRPr lang="en-US" dirty="0"/>
+          </a:p>
+          <a:p>
+            <a:r>
+              <a:rPr lang="en-US" dirty="0">
+                <a:hlinkClick r:id="rId4"/>
+              </a:rPr>
+              <a:t>Modules</a:t>
+            </a:r>
+            <a:endParaRPr lang="en-US" dirty="0"/>
+          </a:p>
+          <a:p>
+            <a:r>
+              <a:rPr lang="en-US" dirty="0">
+                <a:hlinkClick r:id="rId5"/>
+              </a:rPr>
+              <a:t>Controllers</a:t>
+            </a:r>
+            <a:endParaRPr lang="en-US" dirty="0"/>
+          </a:p>
+          <a:p>
+            <a:r>
+              <a:rPr lang="en-US" dirty="0">
+                <a:hlinkClick r:id="rId6"/>
+              </a:rPr>
+              <a:t>Services</a:t>
+            </a:r>
+            <a:endParaRPr lang="en-US" dirty="0"/>
+          </a:p>
+          <a:p>
+            <a:r>
+              <a:rPr lang="en-US" dirty="0" smtClean="0">
+                <a:hlinkClick r:id="rId7"/>
+              </a:rPr>
+              <a:t>Factories</a:t>
+            </a:r>
+            <a:endParaRPr lang="en-US" dirty="0"/>
+          </a:p>
+        </p:txBody>
+      </p:sp>
+      <p:sp>
+        <p:nvSpPr>
+          <p:cNvPr id="4" name="Content Placeholder 3"/>
+          <p:cNvSpPr>
+            <a:spLocks noGrp="1"/>
+          </p:cNvSpPr>
+          <p:nvPr>
+            <p:ph sz="half" idx="2"/>
+          </p:nvPr>
+        </p:nvSpPr>
+        <p:spPr/>
+        <p:txBody>
+          <a:bodyPr>
+            <a:normAutofit/>
+          </a:bodyPr>
+          <a:lstStyle/>
+          <a:p>
+            <a:endParaRPr lang="en-US" dirty="0"/>
+          </a:p>
+          <a:p>
+            <a:r>
+              <a:rPr lang="en-US" dirty="0">
+                <a:hlinkClick r:id="rId8"/>
+              </a:rPr>
+              <a:t>Data Services</a:t>
+            </a:r>
+            <a:endParaRPr lang="en-US" dirty="0"/>
+          </a:p>
+          <a:p>
+            <a:r>
+              <a:rPr lang="en-US" dirty="0">
+                <a:hlinkClick r:id="rId9"/>
+              </a:rPr>
+              <a:t>Directives</a:t>
+            </a:r>
+            <a:endParaRPr lang="en-US" dirty="0"/>
+          </a:p>
+          <a:p>
+            <a:r>
+              <a:rPr lang="en-US" dirty="0">
+                <a:hlinkClick r:id="rId10"/>
+              </a:rPr>
+              <a:t>Manual Annotating for Dependency Injection</a:t>
+            </a:r>
+            <a:endParaRPr lang="en-US" dirty="0"/>
+          </a:p>
+          <a:p>
+            <a:r>
+              <a:rPr lang="en-US" dirty="0" smtClean="0">
+                <a:hlinkClick r:id="rId11"/>
+              </a:rPr>
+              <a:t>Testing</a:t>
+            </a:r>
+            <a:endParaRPr lang="en-US" dirty="0" smtClean="0"/>
+          </a:p>
+          <a:p>
+            <a:r>
+              <a:rPr lang="en-US" dirty="0" smtClean="0">
+                <a:hlinkClick r:id="rId12"/>
+              </a:rPr>
+              <a:t>Angular </a:t>
+            </a:r>
+            <a:r>
+              <a:rPr lang="en-US" dirty="0">
+                <a:hlinkClick r:id="rId12"/>
+              </a:rPr>
+              <a:t>Docs</a:t>
+            </a:r>
+            <a:endParaRPr lang="en-US" dirty="0"/>
+          </a:p>
+          <a:p>
+            <a:endParaRPr lang="en-US" dirty="0"/>
           </a:p>
         </p:txBody>
       </p:sp>
@@ -6182,6 +6350,81 @@
       </p:par>
     </p:tnLst>
   </p:timing>
+</p:sld>
+</file>
+
+<file path=ppt/slides/slide7.xml><?xml version="1.0" encoding="utf-8"?>
+<p:sld xmlns:a="http://schemas.openxmlformats.org/drawingml/2006/main" xmlns:r="http://schemas.openxmlformats.org/officeDocument/2006/relationships" xmlns:p="http://schemas.openxmlformats.org/presentationml/2006/main">
+  <p:cSld>
+    <p:spTree>
+      <p:nvGrpSpPr>
+        <p:cNvPr id="1" name=""/>
+        <p:cNvGrpSpPr/>
+        <p:nvPr/>
+      </p:nvGrpSpPr>
+      <p:grpSpPr>
+        <a:xfrm>
+          <a:off x="0" y="0"/>
+          <a:ext cx="0" cy="0"/>
+          <a:chOff x="0" y="0"/>
+          <a:chExt cx="0" cy="0"/>
+        </a:xfrm>
+      </p:grpSpPr>
+      <p:sp>
+        <p:nvSpPr>
+          <p:cNvPr id="5" name="Title 4"/>
+          <p:cNvSpPr>
+            <a:spLocks noGrp="1"/>
+          </p:cNvSpPr>
+          <p:nvPr>
+            <p:ph type="title"/>
+          </p:nvPr>
+        </p:nvSpPr>
+        <p:spPr/>
+        <p:txBody>
+          <a:bodyPr/>
+          <a:lstStyle/>
+          <a:p>
+            <a:r>
+              <a:rPr lang="en-US" dirty="0" smtClean="0"/>
+              <a:t>The URL</a:t>
+            </a:r>
+            <a:endParaRPr lang="en-US" dirty="0"/>
+          </a:p>
+        </p:txBody>
+      </p:sp>
+      <p:sp>
+        <p:nvSpPr>
+          <p:cNvPr id="6" name="Text Placeholder 5"/>
+          <p:cNvSpPr>
+            <a:spLocks noGrp="1"/>
+          </p:cNvSpPr>
+          <p:nvPr>
+            <p:ph type="body" idx="1"/>
+          </p:nvPr>
+        </p:nvSpPr>
+        <p:spPr/>
+        <p:txBody>
+          <a:bodyPr/>
+          <a:lstStyle/>
+          <a:p>
+            <a:r>
+              <a:rPr lang="en-US" dirty="0"/>
+              <a:t>https://github.com/johnpapa/angular-styleguide/blob/master/a1/README.md</a:t>
+            </a:r>
+          </a:p>
+        </p:txBody>
+      </p:sp>
+    </p:spTree>
+    <p:extLst>
+      <p:ext uri="{BB962C8B-B14F-4D97-AF65-F5344CB8AC3E}">
+        <p14:creationId xmlns:p14="http://schemas.microsoft.com/office/powerpoint/2010/main" val="3318719294"/>
+      </p:ext>
+    </p:extLst>
+  </p:cSld>
+  <p:clrMapOvr>
+    <a:masterClrMapping/>
+  </p:clrMapOvr>
 </p:sld>
 </file>
 

</xml_diff>